<commit_message>
add test cases part
</commit_message>
<xml_diff>
--- a/documents/set4/Presentation4.pptx
+++ b/documents/set4/Presentation4.pptx
@@ -5,7 +5,7 @@
     <p:sldMasterId id="2147483780" r:id="rId1"/>
   </p:sldMasterIdLst>
   <p:notesMasterIdLst>
-    <p:notesMasterId r:id="rId7"/>
+    <p:notesMasterId r:id="rId10"/>
   </p:notesMasterIdLst>
   <p:sldIdLst>
     <p:sldId id="256" r:id="rId2"/>
@@ -13,6 +13,9 @@
     <p:sldId id="258" r:id="rId4"/>
     <p:sldId id="259" r:id="rId5"/>
     <p:sldId id="260" r:id="rId6"/>
+    <p:sldId id="261" r:id="rId7"/>
+    <p:sldId id="263" r:id="rId8"/>
+    <p:sldId id="264" r:id="rId9"/>
   </p:sldIdLst>
   <p:sldSz cx="12192000" cy="6858000"/>
   <p:notesSz cx="6858000" cy="9144000"/>
@@ -111,6 +114,11 @@
       </a:defRPr>
     </a:lvl9pPr>
   </p:defaultTextStyle>
+  <p:extLst>
+    <p:ext uri="{EFAFB233-063F-42B5-8137-9DF3F51BA10A}">
+      <p15:sldGuideLst xmlns:p15="http://schemas.microsoft.com/office/powerpoint/2012/main"/>
+    </p:ext>
+  </p:extLst>
 </p:presentation>
 </file>
 
@@ -4278,11 +4286,7 @@
             </a:r>
             <a:r>
               <a:rPr lang="en-US" dirty="0"/>
-              <a:t>Choose an algorithm</a:t>
-            </a:r>
-            <a:r>
-              <a:rPr lang="en-US" dirty="0"/>
-              <a:t> </a:t>
+              <a:t>Choose an algorithm </a:t>
             </a:r>
             <a:r>
               <a:rPr lang="en-US" dirty="0" smtClean="0"/>
@@ -4340,7 +4344,7 @@
           <p:nvPr>
             <p:extLst>
               <p:ext uri="{386F3935-93C4-4BCD-93E2-E3B085C9AB24}">
-                <p16:designElem xmlns:p16="http://schemas.microsoft.com/office/powerpoint/2015/main" val="1"/>
+                <p16:designElem xmlns:p16="http://schemas.microsoft.com/office/powerpoint/2015/main" xmlns="" val="1"/>
               </p:ext>
             </p:extLst>
           </p:nvPr>
@@ -4391,7 +4395,7 @@
           <p:nvPr>
             <p:extLst>
               <p:ext uri="{386F3935-93C4-4BCD-93E2-E3B085C9AB24}">
-                <p16:designElem xmlns:p16="http://schemas.microsoft.com/office/powerpoint/2015/main" val="1"/>
+                <p16:designElem xmlns:p16="http://schemas.microsoft.com/office/powerpoint/2015/main" xmlns="" val="1"/>
               </p:ext>
             </p:extLst>
           </p:nvPr>
@@ -4437,7 +4441,7 @@
           <p:nvPr>
             <p:extLst>
               <p:ext uri="{386F3935-93C4-4BCD-93E2-E3B085C9AB24}">
-                <p16:designElem xmlns:p16="http://schemas.microsoft.com/office/powerpoint/2015/main" val="1"/>
+                <p16:designElem xmlns:p16="http://schemas.microsoft.com/office/powerpoint/2015/main" xmlns="" val="1"/>
               </p:ext>
             </p:extLst>
           </p:nvPr>
@@ -4474,9 +4478,87 @@
           </a:fontRef>
         </p:style>
       </p:sp>
+      <p:sp>
+        <p:nvSpPr>
+          <p:cNvPr id="2" name="Title 1"/>
+          <p:cNvSpPr>
+            <a:spLocks noGrp="1"/>
+          </p:cNvSpPr>
+          <p:nvPr>
+            <p:ph type="title"/>
+          </p:nvPr>
+        </p:nvSpPr>
+        <p:spPr>
+          <a:xfrm>
+            <a:off x="492370" y="516835"/>
+            <a:ext cx="3084844" cy="2103875"/>
+          </a:xfrm>
+        </p:spPr>
+        <p:txBody>
+          <a:bodyPr>
+            <a:normAutofit/>
+          </a:bodyPr>
+          <a:lstStyle/>
+          <a:p>
+            <a:r>
+              <a:rPr lang="en-US" altLang="zh-CN" sz="3600">
+                <a:solidFill>
+                  <a:srgbClr val="FFFFFF"/>
+                </a:solidFill>
+              </a:rPr>
+              <a:t>Sprint Tasks</a:t>
+            </a:r>
+            <a:endParaRPr lang="en-US" sz="3600">
+              <a:solidFill>
+                <a:srgbClr val="FFFFFF"/>
+              </a:solidFill>
+            </a:endParaRPr>
+          </a:p>
+        </p:txBody>
+      </p:sp>
+      <p:sp>
+        <p:nvSpPr>
+          <p:cNvPr id="3" name="Content Placeholder 2"/>
+          <p:cNvSpPr>
+            <a:spLocks noGrp="1"/>
+          </p:cNvSpPr>
+          <p:nvPr>
+            <p:ph idx="1"/>
+          </p:nvPr>
+        </p:nvSpPr>
+        <p:spPr>
+          <a:xfrm>
+            <a:off x="492371" y="2653800"/>
+            <a:ext cx="3084844" cy="3335519"/>
+          </a:xfrm>
+        </p:spPr>
+        <p:txBody>
+          <a:bodyPr>
+            <a:normAutofit/>
+          </a:bodyPr>
+          <a:lstStyle/>
+          <a:p>
+            <a:r>
+              <a:rPr lang="en-US" sz="1600" dirty="0">
+                <a:solidFill>
+                  <a:srgbClr val="FFFFFF"/>
+                </a:solidFill>
+              </a:rPr>
+              <a:t>Execute the algorithm step by step or for a fixed number of steps</a:t>
+            </a:r>
+          </a:p>
+          <a:p>
+            <a:endParaRPr lang="en-US" sz="1500" dirty="0">
+              <a:solidFill>
+                <a:srgbClr val="FFFFFF"/>
+              </a:solidFill>
+            </a:endParaRPr>
+          </a:p>
+        </p:txBody>
+      </p:sp>
       <p:pic>
         <p:nvPicPr>
-          <p:cNvPr id="5" name="Picture 4"/>
+          <p:cNvPr id="4" name="Picture 3"/>
           <p:cNvPicPr>
             <a:picLocks noChangeAspect="1"/>
           </p:cNvPicPr>
@@ -4490,92 +4572,14 @@
         </p:blipFill>
         <p:spPr>
           <a:xfrm>
-            <a:off x="4379484" y="2212801"/>
-            <a:ext cx="7531426" cy="2447714"/>
+            <a:off x="4040070" y="2221669"/>
+            <a:ext cx="8146245" cy="2414661"/>
           </a:xfrm>
           <a:prstGeom prst="rect">
             <a:avLst/>
           </a:prstGeom>
         </p:spPr>
       </p:pic>
-      <p:sp>
-        <p:nvSpPr>
-          <p:cNvPr id="2" name="Title 1"/>
-          <p:cNvSpPr>
-            <a:spLocks noGrp="1"/>
-          </p:cNvSpPr>
-          <p:nvPr>
-            <p:ph type="title"/>
-          </p:nvPr>
-        </p:nvSpPr>
-        <p:spPr>
-          <a:xfrm>
-            <a:off x="492370" y="516835"/>
-            <a:ext cx="3084844" cy="2103875"/>
-          </a:xfrm>
-        </p:spPr>
-        <p:txBody>
-          <a:bodyPr>
-            <a:normAutofit/>
-          </a:bodyPr>
-          <a:lstStyle/>
-          <a:p>
-            <a:r>
-              <a:rPr lang="en-US" altLang="zh-CN" sz="3600">
-                <a:solidFill>
-                  <a:srgbClr val="FFFFFF"/>
-                </a:solidFill>
-              </a:rPr>
-              <a:t>Sprint Tasks</a:t>
-            </a:r>
-            <a:endParaRPr lang="en-US" sz="3600">
-              <a:solidFill>
-                <a:srgbClr val="FFFFFF"/>
-              </a:solidFill>
-            </a:endParaRPr>
-          </a:p>
-        </p:txBody>
-      </p:sp>
-      <p:sp>
-        <p:nvSpPr>
-          <p:cNvPr id="3" name="Content Placeholder 2"/>
-          <p:cNvSpPr>
-            <a:spLocks noGrp="1"/>
-          </p:cNvSpPr>
-          <p:nvPr>
-            <p:ph idx="1"/>
-          </p:nvPr>
-        </p:nvSpPr>
-        <p:spPr>
-          <a:xfrm>
-            <a:off x="492371" y="2653800"/>
-            <a:ext cx="3084844" cy="3335519"/>
-          </a:xfrm>
-        </p:spPr>
-        <p:txBody>
-          <a:bodyPr>
-            <a:normAutofit/>
-          </a:bodyPr>
-          <a:lstStyle/>
-          <a:p>
-            <a:r>
-              <a:rPr lang="en-US" sz="1600" dirty="0">
-                <a:solidFill>
-                  <a:srgbClr val="FFFFFF"/>
-                </a:solidFill>
-              </a:rPr>
-              <a:t>Execute the algorithm step by step or for a fixed number of steps</a:t>
-            </a:r>
-          </a:p>
-          <a:p>
-            <a:endParaRPr lang="en-US" sz="1500" dirty="0">
-              <a:solidFill>
-                <a:srgbClr val="FFFFFF"/>
-              </a:solidFill>
-            </a:endParaRPr>
-          </a:p>
-        </p:txBody>
-      </p:sp>
     </p:spTree>
     <p:extLst>
       <p:ext uri="{BB962C8B-B14F-4D97-AF65-F5344CB8AC3E}">
@@ -4615,7 +4619,7 @@
           <p:nvPr>
             <p:extLst>
               <p:ext uri="{386F3935-93C4-4BCD-93E2-E3B085C9AB24}">
-                <p16:designElem xmlns:p16="http://schemas.microsoft.com/office/powerpoint/2015/main" val="1"/>
+                <p16:designElem xmlns:p16="http://schemas.microsoft.com/office/powerpoint/2015/main" xmlns="" val="1"/>
               </p:ext>
             </p:extLst>
           </p:nvPr>
@@ -4666,7 +4670,7 @@
           <p:nvPr>
             <p:extLst>
               <p:ext uri="{386F3935-93C4-4BCD-93E2-E3B085C9AB24}">
-                <p16:designElem xmlns:p16="http://schemas.microsoft.com/office/powerpoint/2015/main" val="1"/>
+                <p16:designElem xmlns:p16="http://schemas.microsoft.com/office/powerpoint/2015/main" xmlns="" val="1"/>
               </p:ext>
             </p:extLst>
           </p:nvPr>
@@ -4712,7 +4716,7 @@
           <p:nvPr>
             <p:extLst>
               <p:ext uri="{386F3935-93C4-4BCD-93E2-E3B085C9AB24}">
-                <p16:designElem xmlns:p16="http://schemas.microsoft.com/office/powerpoint/2015/main" val="1"/>
+                <p16:designElem xmlns:p16="http://schemas.microsoft.com/office/powerpoint/2015/main" xmlns="" val="1"/>
               </p:ext>
             </p:extLst>
           </p:nvPr>
@@ -4896,7 +4900,7 @@
           <p:nvPr>
             <p:extLst>
               <p:ext uri="{386F3935-93C4-4BCD-93E2-E3B085C9AB24}">
-                <p16:designElem xmlns:p16="http://schemas.microsoft.com/office/powerpoint/2015/main" val="1"/>
+                <p16:designElem xmlns:p16="http://schemas.microsoft.com/office/powerpoint/2015/main" xmlns="" val="1"/>
               </p:ext>
             </p:extLst>
           </p:nvPr>
@@ -4947,7 +4951,7 @@
           <p:nvPr>
             <p:extLst>
               <p:ext uri="{386F3935-93C4-4BCD-93E2-E3B085C9AB24}">
-                <p16:designElem xmlns:p16="http://schemas.microsoft.com/office/powerpoint/2015/main" val="1"/>
+                <p16:designElem xmlns:p16="http://schemas.microsoft.com/office/powerpoint/2015/main" xmlns="" val="1"/>
               </p:ext>
             </p:extLst>
           </p:nvPr>
@@ -4993,7 +4997,7 @@
           <p:nvPr>
             <p:extLst>
               <p:ext uri="{386F3935-93C4-4BCD-93E2-E3B085C9AB24}">
-                <p16:designElem xmlns:p16="http://schemas.microsoft.com/office/powerpoint/2015/main" val="1"/>
+                <p16:designElem xmlns:p16="http://schemas.microsoft.com/office/powerpoint/2015/main" xmlns="" val="1"/>
               </p:ext>
             </p:extLst>
           </p:nvPr>
@@ -5171,6 +5175,897 @@
     <p:extLst>
       <p:ext uri="{BB962C8B-B14F-4D97-AF65-F5344CB8AC3E}">
         <p14:creationId xmlns:p14="http://schemas.microsoft.com/office/powerpoint/2010/main" val="519604350"/>
+      </p:ext>
+    </p:extLst>
+  </p:cSld>
+  <p:clrMapOvr>
+    <a:masterClrMapping/>
+  </p:clrMapOvr>
+</p:sld>
+</file>
+
+<file path=ppt/slides/slide6.xml><?xml version="1.0" encoding="utf-8"?>
+<p:sld xmlns:a="http://schemas.openxmlformats.org/drawingml/2006/main" xmlns:r="http://schemas.openxmlformats.org/officeDocument/2006/relationships" xmlns:p="http://schemas.openxmlformats.org/presentationml/2006/main">
+  <p:cSld>
+    <p:spTree>
+      <p:nvGrpSpPr>
+        <p:cNvPr id="1" name=""/>
+        <p:cNvGrpSpPr/>
+        <p:nvPr/>
+      </p:nvGrpSpPr>
+      <p:grpSpPr>
+        <a:xfrm>
+          <a:off x="0" y="0"/>
+          <a:ext cx="0" cy="0"/>
+          <a:chOff x="0" y="0"/>
+          <a:chExt cx="0" cy="0"/>
+        </a:xfrm>
+      </p:grpSpPr>
+      <p:sp useBgFill="1">
+        <p:nvSpPr>
+          <p:cNvPr id="16" name="Rectangle 15"/>
+          <p:cNvSpPr>
+            <a:spLocks noGrp="1" noRot="1" noChangeAspect="1" noMove="1" noResize="1" noEditPoints="1" noAdjustHandles="1" noChangeArrowheads="1" noChangeShapeType="1" noTextEdit="1"/>
+          </p:cNvSpPr>
+          <p:nvPr>
+            <p:extLst>
+              <p:ext uri="{386F3935-93C4-4BCD-93E2-E3B085C9AB24}">
+                <p16:designElem xmlns:p16="http://schemas.microsoft.com/office/powerpoint/2015/main" xmlns="" val="1"/>
+              </p:ext>
+            </p:extLst>
+          </p:nvPr>
+        </p:nvSpPr>
+        <p:spPr>
+          <a:xfrm>
+            <a:off x="0" y="0"/>
+            <a:ext cx="12186315" cy="6858000"/>
+          </a:xfrm>
+          <a:prstGeom prst="rect">
+            <a:avLst/>
+          </a:prstGeom>
+          <a:ln>
+            <a:noFill/>
+          </a:ln>
+        </p:spPr>
+        <p:style>
+          <a:lnRef idx="2">
+            <a:schemeClr val="accent6">
+              <a:shade val="50000"/>
+            </a:schemeClr>
+          </a:lnRef>
+          <a:fillRef idx="1001">
+            <a:schemeClr val="lt1"/>
+          </a:fillRef>
+          <a:effectRef idx="0">
+            <a:schemeClr val="accent6"/>
+          </a:effectRef>
+          <a:fontRef idx="minor">
+            <a:schemeClr val="lt1"/>
+          </a:fontRef>
+        </p:style>
+        <p:txBody>
+          <a:bodyPr rtlCol="0" anchor="ctr"/>
+          <a:lstStyle/>
+          <a:p>
+            <a:pPr algn="ctr"/>
+            <a:endParaRPr lang="en-US"/>
+          </a:p>
+        </p:txBody>
+      </p:sp>
+      <p:sp>
+        <p:nvSpPr>
+          <p:cNvPr id="18" name="Rectangle 17"/>
+          <p:cNvSpPr>
+            <a:spLocks noGrp="1" noRot="1" noChangeAspect="1" noMove="1" noResize="1" noEditPoints="1" noAdjustHandles="1" noChangeArrowheads="1" noChangeShapeType="1" noTextEdit="1"/>
+          </p:cNvSpPr>
+          <p:nvPr>
+            <p:extLst>
+              <p:ext uri="{386F3935-93C4-4BCD-93E2-E3B085C9AB24}">
+                <p16:designElem xmlns:p16="http://schemas.microsoft.com/office/powerpoint/2015/main" xmlns="" val="1"/>
+              </p:ext>
+            </p:extLst>
+          </p:nvPr>
+        </p:nvSpPr>
+        <p:spPr>
+          <a:xfrm>
+            <a:off x="16" y="0"/>
+            <a:ext cx="4050791" cy="6858000"/>
+          </a:xfrm>
+          <a:prstGeom prst="rect">
+            <a:avLst/>
+          </a:prstGeom>
+          <a:solidFill>
+            <a:schemeClr val="accent2"/>
+          </a:solidFill>
+          <a:ln>
+            <a:noFill/>
+          </a:ln>
+        </p:spPr>
+        <p:style>
+          <a:lnRef idx="2">
+            <a:schemeClr val="accent1">
+              <a:shade val="50000"/>
+            </a:schemeClr>
+          </a:lnRef>
+          <a:fillRef idx="1">
+            <a:schemeClr val="accent1"/>
+          </a:fillRef>
+          <a:effectRef idx="0">
+            <a:schemeClr val="accent1"/>
+          </a:effectRef>
+          <a:fontRef idx="minor">
+            <a:schemeClr val="lt1"/>
+          </a:fontRef>
+        </p:style>
+      </p:sp>
+      <p:sp>
+        <p:nvSpPr>
+          <p:cNvPr id="20" name="Rectangle 19"/>
+          <p:cNvSpPr>
+            <a:spLocks noGrp="1" noRot="1" noChangeAspect="1" noMove="1" noResize="1" noEditPoints="1" noAdjustHandles="1" noChangeArrowheads="1" noChangeShapeType="1" noTextEdit="1"/>
+          </p:cNvSpPr>
+          <p:nvPr>
+            <p:extLst>
+              <p:ext uri="{386F3935-93C4-4BCD-93E2-E3B085C9AB24}">
+                <p16:designElem xmlns:p16="http://schemas.microsoft.com/office/powerpoint/2015/main" xmlns="" val="1"/>
+              </p:ext>
+            </p:extLst>
+          </p:nvPr>
+        </p:nvSpPr>
+        <p:spPr>
+          <a:xfrm>
+            <a:off x="4040071" y="0"/>
+            <a:ext cx="64008" cy="6858000"/>
+          </a:xfrm>
+          <a:prstGeom prst="rect">
+            <a:avLst/>
+          </a:prstGeom>
+          <a:solidFill>
+            <a:schemeClr val="accent1"/>
+          </a:solidFill>
+          <a:ln>
+            <a:noFill/>
+          </a:ln>
+        </p:spPr>
+        <p:style>
+          <a:lnRef idx="2">
+            <a:schemeClr val="accent1">
+              <a:shade val="50000"/>
+            </a:schemeClr>
+          </a:lnRef>
+          <a:fillRef idx="1">
+            <a:schemeClr val="accent1"/>
+          </a:fillRef>
+          <a:effectRef idx="0">
+            <a:schemeClr val="accent1"/>
+          </a:effectRef>
+          <a:fontRef idx="minor">
+            <a:schemeClr val="lt1"/>
+          </a:fontRef>
+        </p:style>
+      </p:sp>
+      <p:sp>
+        <p:nvSpPr>
+          <p:cNvPr id="2" name="Title 1"/>
+          <p:cNvSpPr>
+            <a:spLocks noGrp="1"/>
+          </p:cNvSpPr>
+          <p:nvPr>
+            <p:ph type="title"/>
+          </p:nvPr>
+        </p:nvSpPr>
+        <p:spPr>
+          <a:xfrm>
+            <a:off x="492370" y="516835"/>
+            <a:ext cx="3084844" cy="2103875"/>
+          </a:xfrm>
+        </p:spPr>
+        <p:txBody>
+          <a:bodyPr>
+            <a:normAutofit fontScale="90000"/>
+          </a:bodyPr>
+          <a:lstStyle/>
+          <a:p>
+            <a:r>
+              <a:rPr lang="en-US" altLang="zh-CN" sz="3600" dirty="0" smtClean="0">
+                <a:solidFill>
+                  <a:srgbClr val="FFFFFF"/>
+                </a:solidFill>
+              </a:rPr>
+              <a:t>Test  cases for</a:t>
+            </a:r>
+            <a:br>
+              <a:rPr lang="en-US" altLang="zh-CN" sz="3600" dirty="0" smtClean="0">
+                <a:solidFill>
+                  <a:srgbClr val="FFFFFF"/>
+                </a:solidFill>
+              </a:rPr>
+            </a:br>
+            <a:r>
+              <a:rPr lang="en-US" altLang="zh-CN" sz="3600" dirty="0" smtClean="0">
+                <a:solidFill>
+                  <a:srgbClr val="FFFFFF"/>
+                </a:solidFill>
+              </a:rPr>
+              <a:t>sprint task 23-</a:t>
+            </a:r>
+            <a:r>
+              <a:rPr lang="zh-CN" altLang="en-US" sz="3600" dirty="0" smtClean="0">
+                <a:solidFill>
+                  <a:srgbClr val="FFFFFF"/>
+                </a:solidFill>
+              </a:rPr>
+              <a:t> </a:t>
+            </a:r>
+            <a:r>
+              <a:rPr lang="en-US" sz="2200" dirty="0">
+                <a:solidFill>
+                  <a:schemeClr val="bg1"/>
+                </a:solidFill>
+              </a:rPr>
+              <a:t>validate the input data before executing the algorithm</a:t>
+            </a:r>
+            <a:r>
+              <a:rPr lang="zh-CN" altLang="en-US" sz="2200" dirty="0">
+                <a:solidFill>
+                  <a:schemeClr val="bg1"/>
+                </a:solidFill>
+              </a:rPr>
+              <a:t> </a:t>
+            </a:r>
+            <a:r>
+              <a:rPr lang="zh-CN" altLang="en-US" sz="3600" dirty="0" smtClean="0">
+                <a:solidFill>
+                  <a:srgbClr val="FFFFFF"/>
+                </a:solidFill>
+              </a:rPr>
+              <a:t/>
+            </a:r>
+            <a:br>
+              <a:rPr lang="zh-CN" altLang="en-US" sz="3600" dirty="0" smtClean="0">
+                <a:solidFill>
+                  <a:srgbClr val="FFFFFF"/>
+                </a:solidFill>
+              </a:rPr>
+            </a:br>
+            <a:r>
+              <a:rPr lang="en-US" altLang="zh-CN" sz="3600" dirty="0" smtClean="0">
+                <a:solidFill>
+                  <a:srgbClr val="FFFFFF"/>
+                </a:solidFill>
+              </a:rPr>
+              <a:t> </a:t>
+            </a:r>
+            <a:endParaRPr lang="en-US" sz="3600" dirty="0">
+              <a:solidFill>
+                <a:srgbClr val="FFFFFF"/>
+              </a:solidFill>
+            </a:endParaRPr>
+          </a:p>
+        </p:txBody>
+      </p:sp>
+      <p:pic>
+        <p:nvPicPr>
+          <p:cNvPr id="6" name="Picture 5"/>
+          <p:cNvPicPr>
+            <a:picLocks noChangeAspect="1"/>
+          </p:cNvPicPr>
+          <p:nvPr/>
+        </p:nvPicPr>
+        <p:blipFill>
+          <a:blip r:embed="rId2"/>
+          <a:stretch>
+            <a:fillRect/>
+          </a:stretch>
+        </p:blipFill>
+        <p:spPr>
+          <a:xfrm>
+            <a:off x="4040071" y="787400"/>
+            <a:ext cx="8146244" cy="5283200"/>
+          </a:xfrm>
+          <a:prstGeom prst="rect">
+            <a:avLst/>
+          </a:prstGeom>
+        </p:spPr>
+      </p:pic>
+    </p:spTree>
+    <p:extLst>
+      <p:ext uri="{BB962C8B-B14F-4D97-AF65-F5344CB8AC3E}">
+        <p14:creationId xmlns:p14="http://schemas.microsoft.com/office/powerpoint/2010/main" val="1402219088"/>
+      </p:ext>
+    </p:extLst>
+  </p:cSld>
+  <p:clrMapOvr>
+    <a:masterClrMapping/>
+  </p:clrMapOvr>
+</p:sld>
+</file>
+
+<file path=ppt/slides/slide7.xml><?xml version="1.0" encoding="utf-8"?>
+<p:sld xmlns:a="http://schemas.openxmlformats.org/drawingml/2006/main" xmlns:r="http://schemas.openxmlformats.org/officeDocument/2006/relationships" xmlns:p="http://schemas.openxmlformats.org/presentationml/2006/main">
+  <p:cSld>
+    <p:spTree>
+      <p:nvGrpSpPr>
+        <p:cNvPr id="1" name=""/>
+        <p:cNvGrpSpPr/>
+        <p:nvPr/>
+      </p:nvGrpSpPr>
+      <p:grpSpPr>
+        <a:xfrm>
+          <a:off x="0" y="0"/>
+          <a:ext cx="0" cy="0"/>
+          <a:chOff x="0" y="0"/>
+          <a:chExt cx="0" cy="0"/>
+        </a:xfrm>
+      </p:grpSpPr>
+      <p:sp useBgFill="1">
+        <p:nvSpPr>
+          <p:cNvPr id="16" name="Rectangle 15"/>
+          <p:cNvSpPr>
+            <a:spLocks noGrp="1" noRot="1" noChangeAspect="1" noMove="1" noResize="1" noEditPoints="1" noAdjustHandles="1" noChangeArrowheads="1" noChangeShapeType="1" noTextEdit="1"/>
+          </p:cNvSpPr>
+          <p:nvPr>
+            <p:extLst>
+              <p:ext uri="{386F3935-93C4-4BCD-93E2-E3B085C9AB24}">
+                <p16:designElem xmlns:p16="http://schemas.microsoft.com/office/powerpoint/2015/main" xmlns="" val="1"/>
+              </p:ext>
+            </p:extLst>
+          </p:nvPr>
+        </p:nvSpPr>
+        <p:spPr>
+          <a:xfrm>
+            <a:off x="0" y="0"/>
+            <a:ext cx="12186315" cy="6858000"/>
+          </a:xfrm>
+          <a:prstGeom prst="rect">
+            <a:avLst/>
+          </a:prstGeom>
+          <a:ln>
+            <a:noFill/>
+          </a:ln>
+        </p:spPr>
+        <p:style>
+          <a:lnRef idx="2">
+            <a:schemeClr val="accent6">
+              <a:shade val="50000"/>
+            </a:schemeClr>
+          </a:lnRef>
+          <a:fillRef idx="1001">
+            <a:schemeClr val="lt1"/>
+          </a:fillRef>
+          <a:effectRef idx="0">
+            <a:schemeClr val="accent6"/>
+          </a:effectRef>
+          <a:fontRef idx="minor">
+            <a:schemeClr val="lt1"/>
+          </a:fontRef>
+        </p:style>
+        <p:txBody>
+          <a:bodyPr rtlCol="0" anchor="ctr"/>
+          <a:lstStyle/>
+          <a:p>
+            <a:pPr algn="ctr"/>
+            <a:endParaRPr lang="en-US"/>
+          </a:p>
+        </p:txBody>
+      </p:sp>
+      <p:sp>
+        <p:nvSpPr>
+          <p:cNvPr id="18" name="Rectangle 17"/>
+          <p:cNvSpPr>
+            <a:spLocks noGrp="1" noRot="1" noChangeAspect="1" noMove="1" noResize="1" noEditPoints="1" noAdjustHandles="1" noChangeArrowheads="1" noChangeShapeType="1" noTextEdit="1"/>
+          </p:cNvSpPr>
+          <p:nvPr>
+            <p:extLst>
+              <p:ext uri="{386F3935-93C4-4BCD-93E2-E3B085C9AB24}">
+                <p16:designElem xmlns:p16="http://schemas.microsoft.com/office/powerpoint/2015/main" xmlns="" val="1"/>
+              </p:ext>
+            </p:extLst>
+          </p:nvPr>
+        </p:nvSpPr>
+        <p:spPr>
+          <a:xfrm>
+            <a:off x="16" y="0"/>
+            <a:ext cx="4050791" cy="6858000"/>
+          </a:xfrm>
+          <a:prstGeom prst="rect">
+            <a:avLst/>
+          </a:prstGeom>
+          <a:solidFill>
+            <a:schemeClr val="accent2"/>
+          </a:solidFill>
+          <a:ln>
+            <a:noFill/>
+          </a:ln>
+        </p:spPr>
+        <p:style>
+          <a:lnRef idx="2">
+            <a:schemeClr val="accent1">
+              <a:shade val="50000"/>
+            </a:schemeClr>
+          </a:lnRef>
+          <a:fillRef idx="1">
+            <a:schemeClr val="accent1"/>
+          </a:fillRef>
+          <a:effectRef idx="0">
+            <a:schemeClr val="accent1"/>
+          </a:effectRef>
+          <a:fontRef idx="minor">
+            <a:schemeClr val="lt1"/>
+          </a:fontRef>
+        </p:style>
+      </p:sp>
+      <p:sp>
+        <p:nvSpPr>
+          <p:cNvPr id="20" name="Rectangle 19"/>
+          <p:cNvSpPr>
+            <a:spLocks noGrp="1" noRot="1" noChangeAspect="1" noMove="1" noResize="1" noEditPoints="1" noAdjustHandles="1" noChangeArrowheads="1" noChangeShapeType="1" noTextEdit="1"/>
+          </p:cNvSpPr>
+          <p:nvPr>
+            <p:extLst>
+              <p:ext uri="{386F3935-93C4-4BCD-93E2-E3B085C9AB24}">
+                <p16:designElem xmlns:p16="http://schemas.microsoft.com/office/powerpoint/2015/main" xmlns="" val="1"/>
+              </p:ext>
+            </p:extLst>
+          </p:nvPr>
+        </p:nvSpPr>
+        <p:spPr>
+          <a:xfrm>
+            <a:off x="4040071" y="0"/>
+            <a:ext cx="64008" cy="6858000"/>
+          </a:xfrm>
+          <a:prstGeom prst="rect">
+            <a:avLst/>
+          </a:prstGeom>
+          <a:solidFill>
+            <a:schemeClr val="accent1"/>
+          </a:solidFill>
+          <a:ln>
+            <a:noFill/>
+          </a:ln>
+        </p:spPr>
+        <p:style>
+          <a:lnRef idx="2">
+            <a:schemeClr val="accent1">
+              <a:shade val="50000"/>
+            </a:schemeClr>
+          </a:lnRef>
+          <a:fillRef idx="1">
+            <a:schemeClr val="accent1"/>
+          </a:fillRef>
+          <a:effectRef idx="0">
+            <a:schemeClr val="accent1"/>
+          </a:effectRef>
+          <a:fontRef idx="minor">
+            <a:schemeClr val="lt1"/>
+          </a:fontRef>
+        </p:style>
+      </p:sp>
+      <p:sp>
+        <p:nvSpPr>
+          <p:cNvPr id="2" name="Title 1"/>
+          <p:cNvSpPr>
+            <a:spLocks noGrp="1"/>
+          </p:cNvSpPr>
+          <p:nvPr>
+            <p:ph type="title"/>
+          </p:nvPr>
+        </p:nvSpPr>
+        <p:spPr>
+          <a:xfrm>
+            <a:off x="492370" y="516835"/>
+            <a:ext cx="3084844" cy="2103875"/>
+          </a:xfrm>
+        </p:spPr>
+        <p:txBody>
+          <a:bodyPr>
+            <a:normAutofit fontScale="90000"/>
+          </a:bodyPr>
+          <a:lstStyle/>
+          <a:p>
+            <a:r>
+              <a:rPr lang="en-US" altLang="zh-CN" sz="3600" dirty="0" smtClean="0">
+                <a:solidFill>
+                  <a:srgbClr val="FFFFFF"/>
+                </a:solidFill>
+              </a:rPr>
+              <a:t>Test  cases for</a:t>
+            </a:r>
+            <a:br>
+              <a:rPr lang="en-US" altLang="zh-CN" sz="3600" dirty="0" smtClean="0">
+                <a:solidFill>
+                  <a:srgbClr val="FFFFFF"/>
+                </a:solidFill>
+              </a:rPr>
+            </a:br>
+            <a:r>
+              <a:rPr lang="en-US" altLang="zh-CN" sz="3600" dirty="0" smtClean="0">
+                <a:solidFill>
+                  <a:srgbClr val="FFFFFF"/>
+                </a:solidFill>
+              </a:rPr>
+              <a:t>sprint task 23-</a:t>
+            </a:r>
+            <a:r>
+              <a:rPr lang="zh-CN" altLang="en-US" sz="3600" dirty="0" smtClean="0">
+                <a:solidFill>
+                  <a:srgbClr val="FFFFFF"/>
+                </a:solidFill>
+              </a:rPr>
+              <a:t> </a:t>
+            </a:r>
+            <a:r>
+              <a:rPr lang="en-US" sz="2200" dirty="0">
+                <a:solidFill>
+                  <a:schemeClr val="bg1"/>
+                </a:solidFill>
+              </a:rPr>
+              <a:t>validate the input data before executing the algorithm</a:t>
+            </a:r>
+            <a:r>
+              <a:rPr lang="zh-CN" altLang="en-US" sz="2200" dirty="0">
+                <a:solidFill>
+                  <a:schemeClr val="bg1"/>
+                </a:solidFill>
+              </a:rPr>
+              <a:t> </a:t>
+            </a:r>
+            <a:r>
+              <a:rPr lang="zh-CN" altLang="en-US" sz="3600" dirty="0" smtClean="0">
+                <a:solidFill>
+                  <a:srgbClr val="FFFFFF"/>
+                </a:solidFill>
+              </a:rPr>
+              <a:t/>
+            </a:r>
+            <a:br>
+              <a:rPr lang="zh-CN" altLang="en-US" sz="3600" dirty="0" smtClean="0">
+                <a:solidFill>
+                  <a:srgbClr val="FFFFFF"/>
+                </a:solidFill>
+              </a:rPr>
+            </a:br>
+            <a:r>
+              <a:rPr lang="en-US" altLang="zh-CN" sz="3600" dirty="0" smtClean="0">
+                <a:solidFill>
+                  <a:srgbClr val="FFFFFF"/>
+                </a:solidFill>
+              </a:rPr>
+              <a:t> </a:t>
+            </a:r>
+            <a:endParaRPr lang="en-US" sz="3600" dirty="0">
+              <a:solidFill>
+                <a:srgbClr val="FFFFFF"/>
+              </a:solidFill>
+            </a:endParaRPr>
+          </a:p>
+        </p:txBody>
+      </p:sp>
+      <p:pic>
+        <p:nvPicPr>
+          <p:cNvPr id="3" name="Picture 2"/>
+          <p:cNvPicPr>
+            <a:picLocks noChangeAspect="1"/>
+          </p:cNvPicPr>
+          <p:nvPr/>
+        </p:nvPicPr>
+        <p:blipFill>
+          <a:blip r:embed="rId2"/>
+          <a:stretch>
+            <a:fillRect/>
+          </a:stretch>
+        </p:blipFill>
+        <p:spPr>
+          <a:xfrm>
+            <a:off x="4104079" y="990600"/>
+            <a:ext cx="8082236" cy="4876800"/>
+          </a:xfrm>
+          <a:prstGeom prst="rect">
+            <a:avLst/>
+          </a:prstGeom>
+        </p:spPr>
+      </p:pic>
+    </p:spTree>
+    <p:extLst>
+      <p:ext uri="{BB962C8B-B14F-4D97-AF65-F5344CB8AC3E}">
+        <p14:creationId xmlns:p14="http://schemas.microsoft.com/office/powerpoint/2010/main" val="1400725862"/>
+      </p:ext>
+    </p:extLst>
+  </p:cSld>
+  <p:clrMapOvr>
+    <a:masterClrMapping/>
+  </p:clrMapOvr>
+</p:sld>
+</file>
+
+<file path=ppt/slides/slide8.xml><?xml version="1.0" encoding="utf-8"?>
+<p:sld xmlns:a="http://schemas.openxmlformats.org/drawingml/2006/main" xmlns:r="http://schemas.openxmlformats.org/officeDocument/2006/relationships" xmlns:p="http://schemas.openxmlformats.org/presentationml/2006/main">
+  <p:cSld>
+    <p:spTree>
+      <p:nvGrpSpPr>
+        <p:cNvPr id="1" name=""/>
+        <p:cNvGrpSpPr/>
+        <p:nvPr/>
+      </p:nvGrpSpPr>
+      <p:grpSpPr>
+        <a:xfrm>
+          <a:off x="0" y="0"/>
+          <a:ext cx="0" cy="0"/>
+          <a:chOff x="0" y="0"/>
+          <a:chExt cx="0" cy="0"/>
+        </a:xfrm>
+      </p:grpSpPr>
+      <p:sp useBgFill="1">
+        <p:nvSpPr>
+          <p:cNvPr id="16" name="Rectangle 15"/>
+          <p:cNvSpPr>
+            <a:spLocks noGrp="1" noRot="1" noChangeAspect="1" noMove="1" noResize="1" noEditPoints="1" noAdjustHandles="1" noChangeArrowheads="1" noChangeShapeType="1" noTextEdit="1"/>
+          </p:cNvSpPr>
+          <p:nvPr>
+            <p:extLst>
+              <p:ext uri="{386F3935-93C4-4BCD-93E2-E3B085C9AB24}">
+                <p16:designElem xmlns:p16="http://schemas.microsoft.com/office/powerpoint/2015/main" xmlns="" val="1"/>
+              </p:ext>
+            </p:extLst>
+          </p:nvPr>
+        </p:nvSpPr>
+        <p:spPr>
+          <a:xfrm>
+            <a:off x="0" y="0"/>
+            <a:ext cx="12186315" cy="6858000"/>
+          </a:xfrm>
+          <a:prstGeom prst="rect">
+            <a:avLst/>
+          </a:prstGeom>
+          <a:ln>
+            <a:noFill/>
+          </a:ln>
+        </p:spPr>
+        <p:style>
+          <a:lnRef idx="2">
+            <a:schemeClr val="accent6">
+              <a:shade val="50000"/>
+            </a:schemeClr>
+          </a:lnRef>
+          <a:fillRef idx="1001">
+            <a:schemeClr val="lt1"/>
+          </a:fillRef>
+          <a:effectRef idx="0">
+            <a:schemeClr val="accent6"/>
+          </a:effectRef>
+          <a:fontRef idx="minor">
+            <a:schemeClr val="lt1"/>
+          </a:fontRef>
+        </p:style>
+        <p:txBody>
+          <a:bodyPr rtlCol="0" anchor="ctr"/>
+          <a:lstStyle/>
+          <a:p>
+            <a:pPr algn="ctr"/>
+            <a:endParaRPr lang="en-US"/>
+          </a:p>
+        </p:txBody>
+      </p:sp>
+      <p:sp>
+        <p:nvSpPr>
+          <p:cNvPr id="18" name="Rectangle 17"/>
+          <p:cNvSpPr>
+            <a:spLocks noGrp="1" noRot="1" noChangeAspect="1" noMove="1" noResize="1" noEditPoints="1" noAdjustHandles="1" noChangeArrowheads="1" noChangeShapeType="1" noTextEdit="1"/>
+          </p:cNvSpPr>
+          <p:nvPr>
+            <p:extLst>
+              <p:ext uri="{386F3935-93C4-4BCD-93E2-E3B085C9AB24}">
+                <p16:designElem xmlns:p16="http://schemas.microsoft.com/office/powerpoint/2015/main" xmlns="" val="1"/>
+              </p:ext>
+            </p:extLst>
+          </p:nvPr>
+        </p:nvSpPr>
+        <p:spPr>
+          <a:xfrm>
+            <a:off x="16" y="0"/>
+            <a:ext cx="4050791" cy="6858000"/>
+          </a:xfrm>
+          <a:prstGeom prst="rect">
+            <a:avLst/>
+          </a:prstGeom>
+          <a:solidFill>
+            <a:schemeClr val="accent2"/>
+          </a:solidFill>
+          <a:ln>
+            <a:noFill/>
+          </a:ln>
+        </p:spPr>
+        <p:style>
+          <a:lnRef idx="2">
+            <a:schemeClr val="accent1">
+              <a:shade val="50000"/>
+            </a:schemeClr>
+          </a:lnRef>
+          <a:fillRef idx="1">
+            <a:schemeClr val="accent1"/>
+          </a:fillRef>
+          <a:effectRef idx="0">
+            <a:schemeClr val="accent1"/>
+          </a:effectRef>
+          <a:fontRef idx="minor">
+            <a:schemeClr val="lt1"/>
+          </a:fontRef>
+        </p:style>
+      </p:sp>
+      <p:sp>
+        <p:nvSpPr>
+          <p:cNvPr id="20" name="Rectangle 19"/>
+          <p:cNvSpPr>
+            <a:spLocks noGrp="1" noRot="1" noChangeAspect="1" noMove="1" noResize="1" noEditPoints="1" noAdjustHandles="1" noChangeArrowheads="1" noChangeShapeType="1" noTextEdit="1"/>
+          </p:cNvSpPr>
+          <p:nvPr>
+            <p:extLst>
+              <p:ext uri="{386F3935-93C4-4BCD-93E2-E3B085C9AB24}">
+                <p16:designElem xmlns:p16="http://schemas.microsoft.com/office/powerpoint/2015/main" xmlns="" val="1"/>
+              </p:ext>
+            </p:extLst>
+          </p:nvPr>
+        </p:nvSpPr>
+        <p:spPr>
+          <a:xfrm>
+            <a:off x="4040071" y="0"/>
+            <a:ext cx="64008" cy="6858000"/>
+          </a:xfrm>
+          <a:prstGeom prst="rect">
+            <a:avLst/>
+          </a:prstGeom>
+          <a:solidFill>
+            <a:schemeClr val="accent1"/>
+          </a:solidFill>
+          <a:ln>
+            <a:noFill/>
+          </a:ln>
+        </p:spPr>
+        <p:style>
+          <a:lnRef idx="2">
+            <a:schemeClr val="accent1">
+              <a:shade val="50000"/>
+            </a:schemeClr>
+          </a:lnRef>
+          <a:fillRef idx="1">
+            <a:schemeClr val="accent1"/>
+          </a:fillRef>
+          <a:effectRef idx="0">
+            <a:schemeClr val="accent1"/>
+          </a:effectRef>
+          <a:fontRef idx="minor">
+            <a:schemeClr val="lt1"/>
+          </a:fontRef>
+        </p:style>
+      </p:sp>
+      <p:sp>
+        <p:nvSpPr>
+          <p:cNvPr id="2" name="Title 1"/>
+          <p:cNvSpPr>
+            <a:spLocks noGrp="1"/>
+          </p:cNvSpPr>
+          <p:nvPr>
+            <p:ph type="title"/>
+          </p:nvPr>
+        </p:nvSpPr>
+        <p:spPr>
+          <a:xfrm>
+            <a:off x="492370" y="516835"/>
+            <a:ext cx="3084844" cy="2103875"/>
+          </a:xfrm>
+        </p:spPr>
+        <p:txBody>
+          <a:bodyPr>
+            <a:normAutofit fontScale="90000"/>
+          </a:bodyPr>
+          <a:lstStyle/>
+          <a:p>
+            <a:r>
+              <a:rPr lang="en-US" altLang="zh-CN" sz="3600" dirty="0" smtClean="0">
+                <a:solidFill>
+                  <a:srgbClr val="FFFFFF"/>
+                </a:solidFill>
+              </a:rPr>
+              <a:t>Test  cases for</a:t>
+            </a:r>
+            <a:br>
+              <a:rPr lang="en-US" altLang="zh-CN" sz="3600" dirty="0" smtClean="0">
+                <a:solidFill>
+                  <a:srgbClr val="FFFFFF"/>
+                </a:solidFill>
+              </a:rPr>
+            </a:br>
+            <a:r>
+              <a:rPr lang="en-US" altLang="zh-CN" sz="3600" dirty="0" smtClean="0">
+                <a:solidFill>
+                  <a:srgbClr val="FFFFFF"/>
+                </a:solidFill>
+              </a:rPr>
+              <a:t>sprint task 23-</a:t>
+            </a:r>
+            <a:r>
+              <a:rPr lang="zh-CN" altLang="en-US" sz="3600" dirty="0" smtClean="0">
+                <a:solidFill>
+                  <a:srgbClr val="FFFFFF"/>
+                </a:solidFill>
+              </a:rPr>
+              <a:t> </a:t>
+            </a:r>
+            <a:r>
+              <a:rPr lang="en-US" sz="2200" dirty="0">
+                <a:solidFill>
+                  <a:schemeClr val="bg1"/>
+                </a:solidFill>
+              </a:rPr>
+              <a:t>validate the input data before executing the algorithm</a:t>
+            </a:r>
+            <a:r>
+              <a:rPr lang="zh-CN" altLang="en-US" sz="2200" dirty="0">
+                <a:solidFill>
+                  <a:schemeClr val="bg1"/>
+                </a:solidFill>
+              </a:rPr>
+              <a:t> </a:t>
+            </a:r>
+            <a:r>
+              <a:rPr lang="zh-CN" altLang="en-US" sz="3600" dirty="0" smtClean="0">
+                <a:solidFill>
+                  <a:srgbClr val="FFFFFF"/>
+                </a:solidFill>
+              </a:rPr>
+              <a:t/>
+            </a:r>
+            <a:br>
+              <a:rPr lang="zh-CN" altLang="en-US" sz="3600" dirty="0" smtClean="0">
+                <a:solidFill>
+                  <a:srgbClr val="FFFFFF"/>
+                </a:solidFill>
+              </a:rPr>
+            </a:br>
+            <a:r>
+              <a:rPr lang="en-US" altLang="zh-CN" sz="3600" dirty="0" smtClean="0">
+                <a:solidFill>
+                  <a:srgbClr val="FFFFFF"/>
+                </a:solidFill>
+              </a:rPr>
+              <a:t> </a:t>
+            </a:r>
+            <a:endParaRPr lang="en-US" sz="3600" dirty="0">
+              <a:solidFill>
+                <a:srgbClr val="FFFFFF"/>
+              </a:solidFill>
+            </a:endParaRPr>
+          </a:p>
+        </p:txBody>
+      </p:sp>
+      <p:pic>
+        <p:nvPicPr>
+          <p:cNvPr id="4" name="Picture 3"/>
+          <p:cNvPicPr>
+            <a:picLocks noChangeAspect="1"/>
+          </p:cNvPicPr>
+          <p:nvPr/>
+        </p:nvPicPr>
+        <p:blipFill>
+          <a:blip r:embed="rId2"/>
+          <a:stretch>
+            <a:fillRect/>
+          </a:stretch>
+        </p:blipFill>
+        <p:spPr>
+          <a:xfrm>
+            <a:off x="4069567" y="838200"/>
+            <a:ext cx="8116747" cy="5181600"/>
+          </a:xfrm>
+          <a:prstGeom prst="rect">
+            <a:avLst/>
+          </a:prstGeom>
+        </p:spPr>
+      </p:pic>
+    </p:spTree>
+    <p:extLst>
+      <p:ext uri="{BB962C8B-B14F-4D97-AF65-F5344CB8AC3E}">
+        <p14:creationId xmlns:p14="http://schemas.microsoft.com/office/powerpoint/2010/main" val="151986414"/>
       </p:ext>
     </p:extLst>
   </p:cSld>

</xml_diff>